<commit_message>
updated ifml and ppt
</commit_message>
<xml_diff>
--- a/ppt/tiw pure html + notes.pptx
+++ b/ppt/tiw pure html + notes.pptx
@@ -219,7 +219,7 @@
           <a:p>
             <a:fld id="{53A6A729-6C2E-4F27-A4E3-40D736D0C99F}" type="datetimeFigureOut">
               <a:rPr lang="it-IT" smtClean="0"/>
-              <a:t>14/07/2022</a:t>
+              <a:t>17/07/2022</a:t>
             </a:fld>
             <a:endParaRPr lang="it-IT"/>
           </a:p>
@@ -630,6 +630,90 @@
 </p:notes>
 </file>
 
+<file path=ppt/notesSlides/notesSlide2.xml><?xml version="1.0" encoding="utf-8"?>
+<p:notes xmlns:a="http://schemas.openxmlformats.org/drawingml/2006/main" xmlns:r="http://schemas.openxmlformats.org/officeDocument/2006/relationships" xmlns:p="http://schemas.openxmlformats.org/presentationml/2006/main">
+  <p:cSld>
+    <p:spTree>
+      <p:nvGrpSpPr>
+        <p:cNvPr id="1" name=""/>
+        <p:cNvGrpSpPr/>
+        <p:nvPr/>
+      </p:nvGrpSpPr>
+      <p:grpSpPr>
+        <a:xfrm>
+          <a:off x="0" y="0"/>
+          <a:ext cx="0" cy="0"/>
+          <a:chOff x="0" y="0"/>
+          <a:chExt cx="0" cy="0"/>
+        </a:xfrm>
+      </p:grpSpPr>
+      <p:sp>
+        <p:nvSpPr>
+          <p:cNvPr id="2" name="Segnaposto immagine diapositiva 1"/>
+          <p:cNvSpPr>
+            <a:spLocks noGrp="1" noRot="1" noChangeAspect="1"/>
+          </p:cNvSpPr>
+          <p:nvPr>
+            <p:ph type="sldImg"/>
+          </p:nvPr>
+        </p:nvSpPr>
+        <p:spPr/>
+      </p:sp>
+      <p:sp>
+        <p:nvSpPr>
+          <p:cNvPr id="3" name="Segnaposto note 2"/>
+          <p:cNvSpPr>
+            <a:spLocks noGrp="1"/>
+          </p:cNvSpPr>
+          <p:nvPr>
+            <p:ph type="body" idx="1"/>
+          </p:nvPr>
+        </p:nvSpPr>
+        <p:spPr/>
+        <p:txBody>
+          <a:bodyPr/>
+          <a:lstStyle/>
+          <a:p>
+            <a:endParaRPr lang="it-IT" dirty="0"/>
+          </a:p>
+        </p:txBody>
+      </p:sp>
+      <p:sp>
+        <p:nvSpPr>
+          <p:cNvPr id="4" name="Segnaposto numero diapositiva 3"/>
+          <p:cNvSpPr>
+            <a:spLocks noGrp="1"/>
+          </p:cNvSpPr>
+          <p:nvPr>
+            <p:ph type="sldNum" sz="quarter" idx="5"/>
+          </p:nvPr>
+        </p:nvSpPr>
+        <p:spPr/>
+        <p:txBody>
+          <a:bodyPr/>
+          <a:lstStyle/>
+          <a:p>
+            <a:fld id="{7ACB5B77-FEDC-4B0C-AE19-E844E3064A60}" type="slidenum">
+              <a:rPr lang="it-IT" smtClean="0"/>
+              <a:t>21</a:t>
+            </a:fld>
+            <a:endParaRPr lang="it-IT"/>
+          </a:p>
+        </p:txBody>
+      </p:sp>
+    </p:spTree>
+    <p:extLst>
+      <p:ext uri="{BB962C8B-B14F-4D97-AF65-F5344CB8AC3E}">
+        <p14:creationId xmlns:p14="http://schemas.microsoft.com/office/powerpoint/2010/main" val="2126477975"/>
+      </p:ext>
+    </p:extLst>
+  </p:cSld>
+  <p:clrMapOvr>
+    <a:masterClrMapping/>
+  </p:clrMapOvr>
+</p:notes>
+</file>
+
 <file path=ppt/slideLayouts/slideLayout1.xml><?xml version="1.0" encoding="utf-8"?>
 <p:sldLayout xmlns:a="http://schemas.openxmlformats.org/drawingml/2006/main" xmlns:r="http://schemas.openxmlformats.org/officeDocument/2006/relationships" xmlns:p="http://schemas.openxmlformats.org/presentationml/2006/main" type="title" preserve="1">
   <p:cSld name="Diapositiva titolo">
@@ -777,7 +861,7 @@
           <a:p>
             <a:fld id="{547AE43D-F810-491C-86DF-3DC82F896653}" type="datetimeFigureOut">
               <a:rPr lang="it-IT" smtClean="0"/>
-              <a:t>14/07/2022</a:t>
+              <a:t>17/07/2022</a:t>
             </a:fld>
             <a:endParaRPr lang="it-IT"/>
           </a:p>
@@ -975,7 +1059,7 @@
           <a:p>
             <a:fld id="{547AE43D-F810-491C-86DF-3DC82F896653}" type="datetimeFigureOut">
               <a:rPr lang="it-IT" smtClean="0"/>
-              <a:t>14/07/2022</a:t>
+              <a:t>17/07/2022</a:t>
             </a:fld>
             <a:endParaRPr lang="it-IT"/>
           </a:p>
@@ -1183,7 +1267,7 @@
           <a:p>
             <a:fld id="{547AE43D-F810-491C-86DF-3DC82F896653}" type="datetimeFigureOut">
               <a:rPr lang="it-IT" smtClean="0"/>
-              <a:t>14/07/2022</a:t>
+              <a:t>17/07/2022</a:t>
             </a:fld>
             <a:endParaRPr lang="it-IT"/>
           </a:p>
@@ -1436,7 +1520,7 @@
             <a:fld id="{1D8BD707-D9CF-40AE-B4C6-C98DA3205C09}" type="datetimeFigureOut">
               <a:rPr lang="en-US" smtClean="0"/>
               <a:pPr/>
-              <a:t>7/14/2022</a:t>
+              <a:t>7/17/2022</a:t>
             </a:fld>
             <a:endParaRPr lang="en-US"/>
           </a:p>
@@ -1606,7 +1690,7 @@
             <a:fld id="{1D8BD707-D9CF-40AE-B4C6-C98DA3205C09}" type="datetimeFigureOut">
               <a:rPr lang="en-US" smtClean="0"/>
               <a:pPr/>
-              <a:t>7/14/2022</a:t>
+              <a:t>7/17/2022</a:t>
             </a:fld>
             <a:endParaRPr lang="en-US"/>
           </a:p>
@@ -1853,7 +1937,7 @@
             <a:fld id="{1D8BD707-D9CF-40AE-B4C6-C98DA3205C09}" type="datetimeFigureOut">
               <a:rPr lang="en-US" smtClean="0"/>
               <a:pPr/>
-              <a:t>7/14/2022</a:t>
+              <a:t>7/17/2022</a:t>
             </a:fld>
             <a:endParaRPr lang="en-US"/>
           </a:p>
@@ -2140,7 +2224,7 @@
             <a:fld id="{1D8BD707-D9CF-40AE-B4C6-C98DA3205C09}" type="datetimeFigureOut">
               <a:rPr lang="en-US" smtClean="0"/>
               <a:pPr/>
-              <a:t>7/14/2022</a:t>
+              <a:t>7/17/2022</a:t>
             </a:fld>
             <a:endParaRPr lang="en-US"/>
           </a:p>
@@ -2561,7 +2645,7 @@
             <a:fld id="{1D8BD707-D9CF-40AE-B4C6-C98DA3205C09}" type="datetimeFigureOut">
               <a:rPr lang="en-US" smtClean="0"/>
               <a:pPr/>
-              <a:t>7/14/2022</a:t>
+              <a:t>7/17/2022</a:t>
             </a:fld>
             <a:endParaRPr lang="en-US"/>
           </a:p>
@@ -2680,7 +2764,7 @@
             <a:fld id="{1D8BD707-D9CF-40AE-B4C6-C98DA3205C09}" type="datetimeFigureOut">
               <a:rPr lang="en-US" smtClean="0"/>
               <a:pPr/>
-              <a:t>7/14/2022</a:t>
+              <a:t>7/17/2022</a:t>
             </a:fld>
             <a:endParaRPr lang="en-US"/>
           </a:p>
@@ -2777,7 +2861,7 @@
             <a:fld id="{1D8BD707-D9CF-40AE-B4C6-C98DA3205C09}" type="datetimeFigureOut">
               <a:rPr lang="en-US" smtClean="0"/>
               <a:pPr/>
-              <a:t>7/14/2022</a:t>
+              <a:t>7/17/2022</a:t>
             </a:fld>
             <a:endParaRPr lang="en-US"/>
           </a:p>
@@ -3054,7 +3138,7 @@
             <a:fld id="{1D8BD707-D9CF-40AE-B4C6-C98DA3205C09}" type="datetimeFigureOut">
               <a:rPr lang="en-US" smtClean="0"/>
               <a:pPr/>
-              <a:t>7/14/2022</a:t>
+              <a:t>7/17/2022</a:t>
             </a:fld>
             <a:endParaRPr lang="en-US"/>
           </a:p>
@@ -3241,7 +3325,7 @@
           <a:p>
             <a:fld id="{547AE43D-F810-491C-86DF-3DC82F896653}" type="datetimeFigureOut">
               <a:rPr lang="it-IT" smtClean="0"/>
-              <a:t>14/07/2022</a:t>
+              <a:t>17/07/2022</a:t>
             </a:fld>
             <a:endParaRPr lang="it-IT"/>
           </a:p>
@@ -3506,7 +3590,7 @@
             <a:fld id="{1D8BD707-D9CF-40AE-B4C6-C98DA3205C09}" type="datetimeFigureOut">
               <a:rPr lang="en-US" smtClean="0"/>
               <a:pPr/>
-              <a:t>7/14/2022</a:t>
+              <a:t>7/17/2022</a:t>
             </a:fld>
             <a:endParaRPr lang="en-US"/>
           </a:p>
@@ -3676,7 +3760,7 @@
             <a:fld id="{1D8BD707-D9CF-40AE-B4C6-C98DA3205C09}" type="datetimeFigureOut">
               <a:rPr lang="en-US" smtClean="0"/>
               <a:pPr/>
-              <a:t>7/14/2022</a:t>
+              <a:t>7/17/2022</a:t>
             </a:fld>
             <a:endParaRPr lang="en-US"/>
           </a:p>
@@ -3856,7 +3940,7 @@
             <a:fld id="{1D8BD707-D9CF-40AE-B4C6-C98DA3205C09}" type="datetimeFigureOut">
               <a:rPr lang="en-US" smtClean="0"/>
               <a:pPr/>
-              <a:t>7/14/2022</a:t>
+              <a:t>7/17/2022</a:t>
             </a:fld>
             <a:endParaRPr lang="en-US"/>
           </a:p>
@@ -4292,7 +4376,7 @@
           <a:p>
             <a:fld id="{547AE43D-F810-491C-86DF-3DC82F896653}" type="datetimeFigureOut">
               <a:rPr lang="it-IT" smtClean="0"/>
-              <a:t>14/07/2022</a:t>
+              <a:t>17/07/2022</a:t>
             </a:fld>
             <a:endParaRPr lang="it-IT"/>
           </a:p>
@@ -4557,7 +4641,7 @@
           <a:p>
             <a:fld id="{547AE43D-F810-491C-86DF-3DC82F896653}" type="datetimeFigureOut">
               <a:rPr lang="it-IT" smtClean="0"/>
-              <a:t>14/07/2022</a:t>
+              <a:t>17/07/2022</a:t>
             </a:fld>
             <a:endParaRPr lang="it-IT"/>
           </a:p>
@@ -4969,7 +5053,7 @@
           <a:p>
             <a:fld id="{547AE43D-F810-491C-86DF-3DC82F896653}" type="datetimeFigureOut">
               <a:rPr lang="it-IT" smtClean="0"/>
-              <a:t>14/07/2022</a:t>
+              <a:t>17/07/2022</a:t>
             </a:fld>
             <a:endParaRPr lang="it-IT"/>
           </a:p>
@@ -5110,7 +5194,7 @@
           <a:p>
             <a:fld id="{547AE43D-F810-491C-86DF-3DC82F896653}" type="datetimeFigureOut">
               <a:rPr lang="it-IT" smtClean="0"/>
-              <a:t>14/07/2022</a:t>
+              <a:t>17/07/2022</a:t>
             </a:fld>
             <a:endParaRPr lang="it-IT"/>
           </a:p>
@@ -5223,7 +5307,7 @@
           <a:p>
             <a:fld id="{547AE43D-F810-491C-86DF-3DC82F896653}" type="datetimeFigureOut">
               <a:rPr lang="it-IT" smtClean="0"/>
-              <a:t>14/07/2022</a:t>
+              <a:t>17/07/2022</a:t>
             </a:fld>
             <a:endParaRPr lang="it-IT"/>
           </a:p>
@@ -5534,7 +5618,7 @@
           <a:p>
             <a:fld id="{547AE43D-F810-491C-86DF-3DC82F896653}" type="datetimeFigureOut">
               <a:rPr lang="it-IT" smtClean="0"/>
-              <a:t>14/07/2022</a:t>
+              <a:t>17/07/2022</a:t>
             </a:fld>
             <a:endParaRPr lang="it-IT"/>
           </a:p>
@@ -5822,7 +5906,7 @@
           <a:p>
             <a:fld id="{547AE43D-F810-491C-86DF-3DC82F896653}" type="datetimeFigureOut">
               <a:rPr lang="it-IT" smtClean="0"/>
-              <a:t>14/07/2022</a:t>
+              <a:t>17/07/2022</a:t>
             </a:fld>
             <a:endParaRPr lang="it-IT"/>
           </a:p>
@@ -6063,7 +6147,7 @@
           <a:p>
             <a:fld id="{547AE43D-F810-491C-86DF-3DC82F896653}" type="datetimeFigureOut">
               <a:rPr lang="it-IT" smtClean="0"/>
-              <a:t>14/07/2022</a:t>
+              <a:t>17/07/2022</a:t>
             </a:fld>
             <a:endParaRPr lang="it-IT"/>
           </a:p>
@@ -6614,7 +6698,7 @@
             <a:fld id="{1D8BD707-D9CF-40AE-B4C6-C98DA3205C09}" type="datetimeFigureOut">
               <a:rPr lang="en-US" smtClean="0"/>
               <a:pPr/>
-              <a:t>7/14/2022</a:t>
+              <a:t>7/17/2022</a:t>
             </a:fld>
             <a:endParaRPr lang="en-US"/>
           </a:p>
@@ -7121,10 +7205,10 @@
       </p:sp>
       <p:pic>
         <p:nvPicPr>
-          <p:cNvPr id="7" name="Segnaposto contenuto 6">
-            <a:extLst>
-              <a:ext uri="{FF2B5EF4-FFF2-40B4-BE49-F238E27FC236}">
-                <a16:creationId xmlns:a16="http://schemas.microsoft.com/office/drawing/2014/main" id="{BEE4ED46-2957-63C8-C7C4-0D89D8379287}"/>
+          <p:cNvPr id="6" name="Segnaposto contenuto 5">
+            <a:extLst>
+              <a:ext uri="{FF2B5EF4-FFF2-40B4-BE49-F238E27FC236}">
+                <a16:creationId xmlns:a16="http://schemas.microsoft.com/office/drawing/2014/main" id="{BF77975B-189F-69F6-D9DA-3C39E72C36CD}"/>
               </a:ext>
             </a:extLst>
           </p:cNvPr>
@@ -7149,8 +7233,8 @@
         </p:blipFill>
         <p:spPr>
           <a:xfrm>
-            <a:off x="-709132" y="95693"/>
-            <a:ext cx="13610264" cy="7314647"/>
+            <a:off x="-99304" y="0"/>
+            <a:ext cx="13262411" cy="7462193"/>
           </a:xfrm>
         </p:spPr>
       </p:pic>
@@ -7224,7 +7308,7 @@
         </p:spPr>
         <p:txBody>
           <a:bodyPr>
-            <a:normAutofit fontScale="70000" lnSpcReduction="20000"/>
+            <a:normAutofit fontScale="62500" lnSpcReduction="20000"/>
           </a:bodyPr>
           <a:lstStyle/>
           <a:p>
@@ -7260,7 +7344,7 @@
             <a:r>
               <a:rPr lang="en-US" dirty="0" err="1">
                 <a:solidFill>
-                  <a:srgbClr val="00B0F0"/>
+                  <a:srgbClr val="00B050"/>
                 </a:solidFill>
               </a:rPr>
               <a:t>MeetingForm</a:t>
@@ -7268,7 +7352,7 @@
             <a:r>
               <a:rPr lang="en-US" dirty="0">
                 <a:solidFill>
-                  <a:srgbClr val="00B0F0"/>
+                  <a:srgbClr val="00B050"/>
                 </a:solidFill>
               </a:rPr>
               <a:t> (for support)</a:t>
@@ -7294,79 +7378,20 @@
             </a:r>
           </a:p>
           <a:p>
+            <a:r>
+              <a:rPr lang="en-US" dirty="0"/>
+              <a:t>Utilities</a:t>
+            </a:r>
+          </a:p>
+          <a:p>
             <a:pPr lvl="1"/>
             <a:r>
               <a:rPr lang="en-US" dirty="0" err="1">
                 <a:solidFill>
-                  <a:srgbClr val="FF0000"/>
-                </a:solidFill>
-              </a:rPr>
-              <a:t>ConnectionHandler</a:t>
-            </a:r>
-            <a:r>
-              <a:rPr lang="en-US" dirty="0">
-                <a:solidFill>
-                  <a:srgbClr val="FF0000"/>
-                </a:solidFill>
-              </a:rPr>
-              <a:t>(for support) maybe doesn’t work</a:t>
-            </a:r>
-          </a:p>
-          <a:p>
-            <a:r>
-              <a:rPr lang="en-US" dirty="0"/>
-              <a:t>Data Access Objects (Classes)</a:t>
-            </a:r>
-          </a:p>
-          <a:p>
-            <a:pPr lvl="1"/>
-            <a:r>
-              <a:rPr lang="en-US" dirty="0" err="1"/>
-              <a:t>UserDAO</a:t>
-            </a:r>
-            <a:endParaRPr lang="en-US" dirty="0"/>
-          </a:p>
-          <a:p>
-            <a:pPr lvl="2"/>
-            <a:r>
-              <a:rPr lang="en-US" dirty="0" err="1">
-                <a:solidFill>
-                  <a:srgbClr val="00B0F0"/>
-                </a:solidFill>
-              </a:rPr>
-              <a:t>findAllUsers</a:t>
-            </a:r>
-            <a:endParaRPr lang="en-US" dirty="0">
-              <a:solidFill>
-                <a:srgbClr val="00B0F0"/>
-              </a:solidFill>
-            </a:endParaRPr>
-          </a:p>
-          <a:p>
-            <a:pPr lvl="2"/>
-            <a:r>
-              <a:rPr lang="en-US" dirty="0" err="1">
-                <a:solidFill>
-                  <a:srgbClr val="00B0F0"/>
-                </a:solidFill>
-              </a:rPr>
-              <a:t>findIDByNick</a:t>
-            </a:r>
-            <a:endParaRPr lang="en-US" dirty="0">
-              <a:solidFill>
-                <a:srgbClr val="00B0F0"/>
-              </a:solidFill>
-            </a:endParaRPr>
-          </a:p>
-          <a:p>
-            <a:pPr lvl="2"/>
-            <a:r>
-              <a:rPr lang="en-US" dirty="0" err="1">
-                <a:solidFill>
                   <a:srgbClr val="00B050"/>
                 </a:solidFill>
               </a:rPr>
-              <a:t>createUser</a:t>
+              <a:t>DateChecker</a:t>
             </a:r>
             <a:endParaRPr lang="en-US" dirty="0">
               <a:solidFill>
@@ -7375,6 +7400,32 @@
             </a:endParaRPr>
           </a:p>
           <a:p>
+            <a:pPr lvl="1"/>
+            <a:r>
+              <a:rPr lang="en-US" dirty="0" err="1">
+                <a:solidFill>
+                  <a:srgbClr val="FF0000"/>
+                </a:solidFill>
+              </a:rPr>
+              <a:t>ConnectionHandler</a:t>
+            </a:r>
+            <a:endParaRPr lang="en-US" dirty="0"/>
+          </a:p>
+          <a:p>
+            <a:r>
+              <a:rPr lang="en-US" dirty="0"/>
+              <a:t>Data Access Objects (Classes)</a:t>
+            </a:r>
+          </a:p>
+          <a:p>
+            <a:pPr lvl="1"/>
+            <a:r>
+              <a:rPr lang="en-US" dirty="0" err="1"/>
+              <a:t>UserDAO</a:t>
+            </a:r>
+            <a:endParaRPr lang="en-US" dirty="0"/>
+          </a:p>
+          <a:p>
             <a:pPr lvl="2"/>
             <a:r>
               <a:rPr lang="en-US" dirty="0" err="1">
@@ -7382,7 +7433,7 @@
                   <a:srgbClr val="00B050"/>
                 </a:solidFill>
               </a:rPr>
-              <a:t>checkCredentials</a:t>
+              <a:t>getIDbyNick</a:t>
             </a:r>
             <a:endParaRPr lang="en-US" dirty="0">
               <a:solidFill>
@@ -7398,7 +7449,7 @@
                   <a:srgbClr val="00B050"/>
                 </a:solidFill>
               </a:rPr>
-              <a:t>checkExistence</a:t>
+              <a:t>getNickbyID</a:t>
             </a:r>
             <a:endParaRPr lang="en-US" dirty="0">
               <a:solidFill>
@@ -7407,6 +7458,86 @@
             </a:endParaRPr>
           </a:p>
           <a:p>
+            <a:pPr lvl="2"/>
+            <a:r>
+              <a:rPr lang="en-US" dirty="0" err="1">
+                <a:solidFill>
+                  <a:srgbClr val="00B050"/>
+                </a:solidFill>
+              </a:rPr>
+              <a:t>createUser</a:t>
+            </a:r>
+            <a:endParaRPr lang="en-US" dirty="0">
+              <a:solidFill>
+                <a:srgbClr val="00B050"/>
+              </a:solidFill>
+            </a:endParaRPr>
+          </a:p>
+          <a:p>
+            <a:pPr lvl="2"/>
+            <a:r>
+              <a:rPr lang="en-US" dirty="0" err="1">
+                <a:solidFill>
+                  <a:srgbClr val="00B050"/>
+                </a:solidFill>
+              </a:rPr>
+              <a:t>checkCredentials</a:t>
+            </a:r>
+            <a:endParaRPr lang="en-US" dirty="0">
+              <a:solidFill>
+                <a:srgbClr val="00B050"/>
+              </a:solidFill>
+            </a:endParaRPr>
+          </a:p>
+          <a:p>
+            <a:pPr lvl="2"/>
+            <a:r>
+              <a:rPr lang="en-US" dirty="0" err="1">
+                <a:solidFill>
+                  <a:srgbClr val="00B050"/>
+                </a:solidFill>
+              </a:rPr>
+              <a:t>checkAvailability</a:t>
+            </a:r>
+            <a:endParaRPr lang="en-US" dirty="0">
+              <a:solidFill>
+                <a:srgbClr val="00B050"/>
+              </a:solidFill>
+            </a:endParaRPr>
+          </a:p>
+          <a:p>
+            <a:pPr lvl="2"/>
+            <a:r>
+              <a:rPr lang="en-US" dirty="0" err="1">
+                <a:solidFill>
+                  <a:srgbClr val="00B050"/>
+                </a:solidFill>
+              </a:rPr>
+              <a:t>getRegisteredUsers</a:t>
+            </a:r>
+            <a:endParaRPr lang="en-US" dirty="0">
+              <a:solidFill>
+                <a:srgbClr val="00B050"/>
+              </a:solidFill>
+            </a:endParaRPr>
+          </a:p>
+          <a:p>
+            <a:pPr lvl="2"/>
+            <a:r>
+              <a:rPr lang="en-US" dirty="0" err="1">
+                <a:solidFill>
+                  <a:srgbClr val="00B050"/>
+                </a:solidFill>
+              </a:rPr>
+              <a:t>getRegisteredUserByNick</a:t>
+            </a:r>
+            <a:endParaRPr lang="en-US" dirty="0">
+              <a:solidFill>
+                <a:srgbClr val="00B050"/>
+              </a:solidFill>
+            </a:endParaRPr>
+          </a:p>
+          <a:p>
             <a:pPr lvl="1"/>
             <a:r>
               <a:rPr lang="en-US" dirty="0" err="1"/>
@@ -7419,14 +7550,14 @@
             <a:r>
               <a:rPr lang="en-US" dirty="0" err="1">
                 <a:solidFill>
-                  <a:srgbClr val="00B0F0"/>
+                  <a:srgbClr val="00B050"/>
                 </a:solidFill>
               </a:rPr>
               <a:t>findCreatedMeetings</a:t>
             </a:r>
             <a:endParaRPr lang="en-US" dirty="0">
               <a:solidFill>
-                <a:srgbClr val="00B0F0"/>
+                <a:srgbClr val="00B050"/>
               </a:solidFill>
             </a:endParaRPr>
           </a:p>
@@ -7435,14 +7566,14 @@
             <a:r>
               <a:rPr lang="en-US" dirty="0" err="1">
                 <a:solidFill>
-                  <a:srgbClr val="00B0F0"/>
+                  <a:srgbClr val="00B050"/>
                 </a:solidFill>
               </a:rPr>
               <a:t>findInvitedMeetings</a:t>
             </a:r>
             <a:endParaRPr lang="en-US" dirty="0">
               <a:solidFill>
-                <a:srgbClr val="00B0F0"/>
+                <a:srgbClr val="00B050"/>
               </a:solidFill>
             </a:endParaRPr>
           </a:p>
@@ -7451,24 +7582,32 @@
             <a:r>
               <a:rPr lang="en-US" dirty="0" err="1">
                 <a:solidFill>
-                  <a:srgbClr val="00B0F0"/>
+                  <a:srgbClr val="00B050"/>
                 </a:solidFill>
               </a:rPr>
               <a:t>createMeeting</a:t>
             </a:r>
             <a:endParaRPr lang="en-US" dirty="0">
               <a:solidFill>
-                <a:srgbClr val="00B0F0"/>
+                <a:srgbClr val="00B050"/>
               </a:solidFill>
             </a:endParaRPr>
           </a:p>
           <a:p>
             <a:pPr lvl="2"/>
             <a:r>
-              <a:rPr lang="en-US" dirty="0" err="1"/>
+              <a:rPr lang="en-US" dirty="0" err="1">
+                <a:solidFill>
+                  <a:srgbClr val="00B050"/>
+                </a:solidFill>
+              </a:rPr>
               <a:t>sendInvitation</a:t>
             </a:r>
-            <a:endParaRPr lang="en-US" dirty="0"/>
+            <a:endParaRPr lang="en-US" dirty="0">
+              <a:solidFill>
+                <a:srgbClr val="00B050"/>
+              </a:solidFill>
+            </a:endParaRPr>
           </a:p>
         </p:txBody>
       </p:sp>
@@ -7490,26 +7629,26 @@
         </p:spPr>
         <p:txBody>
           <a:bodyPr>
-            <a:normAutofit fontScale="70000" lnSpcReduction="20000"/>
+            <a:noAutofit/>
           </a:bodyPr>
           <a:lstStyle/>
           <a:p>
             <a:r>
-              <a:rPr lang="en-US" dirty="0"/>
+              <a:rPr lang="en-US" sz="1800" dirty="0"/>
               <a:t>Controllers (servlets)</a:t>
             </a:r>
           </a:p>
           <a:p>
             <a:pPr lvl="1"/>
             <a:r>
-              <a:rPr lang="en-US" dirty="0" err="1">
+              <a:rPr lang="en-US" sz="1600" dirty="0" err="1">
                 <a:solidFill>
                   <a:srgbClr val="00B050"/>
                 </a:solidFill>
               </a:rPr>
               <a:t>CreateUser</a:t>
             </a:r>
-            <a:endParaRPr lang="en-US" dirty="0">
+            <a:endParaRPr lang="en-US" sz="1600" dirty="0">
               <a:solidFill>
                 <a:srgbClr val="00B050"/>
               </a:solidFill>
@@ -7518,38 +7657,14 @@
           <a:p>
             <a:pPr lvl="1"/>
             <a:r>
-              <a:rPr lang="en-US" dirty="0" err="1">
-                <a:solidFill>
-                  <a:srgbClr val="00B0F0"/>
-                </a:solidFill>
-              </a:rPr>
-              <a:t>CreateMeeting</a:t>
-            </a:r>
-            <a:endParaRPr lang="en-US" dirty="0">
-              <a:solidFill>
-                <a:srgbClr val="00B0F0"/>
-              </a:solidFill>
-            </a:endParaRPr>
-          </a:p>
-          <a:p>
-            <a:pPr lvl="1"/>
-            <a:r>
-              <a:rPr lang="en-US" dirty="0" err="1"/>
-              <a:t>InvitePeople</a:t>
-            </a:r>
-            <a:endParaRPr lang="en-US" dirty="0"/>
-          </a:p>
-          <a:p>
-            <a:pPr lvl="1"/>
-            <a:r>
-              <a:rPr lang="en-US" dirty="0" err="1">
+              <a:rPr lang="en-US" sz="1600" dirty="0" err="1">
                 <a:solidFill>
                   <a:srgbClr val="00B050"/>
                 </a:solidFill>
               </a:rPr>
               <a:t>CheckLogin</a:t>
             </a:r>
-            <a:endParaRPr lang="en-US" dirty="0">
+            <a:endParaRPr lang="en-US" sz="1600" dirty="0">
               <a:solidFill>
                 <a:srgbClr val="00B050"/>
               </a:solidFill>
@@ -7558,22 +7673,14 @@
           <a:p>
             <a:pPr lvl="1"/>
             <a:r>
-              <a:rPr lang="en-US" dirty="0" err="1"/>
-              <a:t>GetUsers</a:t>
-            </a:r>
-            <a:endParaRPr lang="en-US" dirty="0"/>
-          </a:p>
-          <a:p>
-            <a:pPr lvl="1"/>
-            <a:r>
-              <a:rPr lang="en-US" dirty="0" err="1">
+              <a:rPr lang="en-US" sz="1600" dirty="0" err="1">
                 <a:solidFill>
                   <a:srgbClr val="00B050"/>
                 </a:solidFill>
               </a:rPr>
               <a:t>GoToHomepage</a:t>
             </a:r>
-            <a:endParaRPr lang="en-US" dirty="0">
+            <a:endParaRPr lang="en-US" sz="1600" dirty="0">
               <a:solidFill>
                 <a:srgbClr val="00B050"/>
               </a:solidFill>
@@ -7582,67 +7689,14 @@
           <a:p>
             <a:pPr lvl="1"/>
             <a:r>
-              <a:rPr lang="en-US" dirty="0">
+              <a:rPr lang="en-US" sz="1600" dirty="0" err="1">
                 <a:solidFill>
                   <a:srgbClr val="00B050"/>
                 </a:solidFill>
               </a:rPr>
-              <a:t>Logout</a:t>
-            </a:r>
-          </a:p>
-          <a:p>
-            <a:r>
-              <a:rPr lang="en-US" dirty="0"/>
-              <a:t>Views (Templates)</a:t>
-            </a:r>
-          </a:p>
-          <a:p>
-            <a:pPr lvl="1"/>
-            <a:r>
-              <a:rPr lang="en-US" dirty="0">
-                <a:solidFill>
-                  <a:srgbClr val="00B050"/>
-                </a:solidFill>
-              </a:rPr>
-              <a:t>Homepage.html </a:t>
-            </a:r>
-            <a:r>
-              <a:rPr lang="en-US" dirty="0"/>
-              <a:t>(</a:t>
-            </a:r>
-            <a:r>
-              <a:rPr lang="en-US" dirty="0" err="1"/>
-              <a:t>c’è</a:t>
-            </a:r>
-            <a:r>
-              <a:rPr lang="en-US" dirty="0"/>
-              <a:t> e </a:t>
-            </a:r>
-            <a:r>
-              <a:rPr lang="en-US" dirty="0" err="1"/>
-              <a:t>sembra</a:t>
-            </a:r>
-            <a:r>
-              <a:rPr lang="en-US" dirty="0"/>
-              <a:t> </a:t>
-            </a:r>
-            <a:r>
-              <a:rPr lang="en-US" dirty="0" err="1"/>
-              <a:t>funzionare</a:t>
-            </a:r>
-            <a:r>
-              <a:rPr lang="en-US" dirty="0"/>
-              <a:t> ma è molto </a:t>
-            </a:r>
-            <a:r>
-              <a:rPr lang="en-US" dirty="0" err="1"/>
-              <a:t>brutta</a:t>
-            </a:r>
-            <a:r>
-              <a:rPr lang="en-US" dirty="0"/>
-              <a:t>)</a:t>
-            </a:r>
-            <a:endParaRPr lang="en-US" dirty="0">
+              <a:t>GoToRecordsPage</a:t>
+            </a:r>
+            <a:endParaRPr lang="en-US" sz="1600" dirty="0">
               <a:solidFill>
                 <a:srgbClr val="00B050"/>
               </a:solidFill>
@@ -7651,112 +7705,176 @@
           <a:p>
             <a:pPr lvl="1"/>
             <a:r>
-              <a:rPr lang="en-US" dirty="0">
+              <a:rPr lang="en-US" sz="1600" dirty="0" err="1">
                 <a:solidFill>
                   <a:srgbClr val="00B050"/>
                 </a:solidFill>
               </a:rPr>
-              <a:t>SignUp.html</a:t>
-            </a:r>
-            <a:r>
-              <a:rPr lang="en-US" dirty="0">
-                <a:solidFill>
-                  <a:srgbClr val="00B0F0"/>
+              <a:t>InvitePeople</a:t>
+            </a:r>
+            <a:endParaRPr lang="en-US" sz="1600" dirty="0">
+              <a:solidFill>
+                <a:srgbClr val="00B050"/>
+              </a:solidFill>
+            </a:endParaRPr>
+          </a:p>
+          <a:p>
+            <a:pPr lvl="1"/>
+            <a:r>
+              <a:rPr lang="en-US" sz="1600" dirty="0">
+                <a:solidFill>
+                  <a:srgbClr val="00B050"/>
+                </a:solidFill>
+              </a:rPr>
+              <a:t>Logout</a:t>
+            </a:r>
+          </a:p>
+          <a:p>
+            <a:r>
+              <a:rPr lang="en-US" sz="1800" dirty="0"/>
+              <a:t>Views (Templates)</a:t>
+            </a:r>
+          </a:p>
+          <a:p>
+            <a:pPr lvl="1"/>
+            <a:r>
+              <a:rPr lang="en-US" sz="1600" dirty="0">
+                <a:solidFill>
+                  <a:srgbClr val="00B050"/>
+                </a:solidFill>
+              </a:rPr>
+              <a:t>Homepage.html</a:t>
+            </a:r>
+          </a:p>
+          <a:p>
+            <a:pPr lvl="1"/>
+            <a:r>
+              <a:rPr lang="en-US" sz="1600" dirty="0">
+                <a:solidFill>
+                  <a:srgbClr val="00B050"/>
+                </a:solidFill>
+              </a:rPr>
+              <a:t>SignUp.html (form </a:t>
+            </a:r>
+            <a:r>
+              <a:rPr lang="en-US" sz="1600" dirty="0" err="1">
+                <a:solidFill>
+                  <a:srgbClr val="00B050"/>
+                </a:solidFill>
+              </a:rPr>
+              <a:t>registrazione</a:t>
+            </a:r>
+            <a:r>
+              <a:rPr lang="en-US" sz="1600" dirty="0">
+                <a:solidFill>
+                  <a:srgbClr val="00B050"/>
+                </a:solidFill>
+              </a:rPr>
+              <a:t>) </a:t>
+            </a:r>
+          </a:p>
+          <a:p>
+            <a:pPr lvl="1"/>
+            <a:r>
+              <a:rPr lang="en-US" sz="1600" dirty="0">
+                <a:solidFill>
+                  <a:srgbClr val="00B050"/>
+                </a:solidFill>
+              </a:rPr>
+              <a:t>RecordsPage.html (</a:t>
+            </a:r>
+            <a:r>
+              <a:rPr lang="en-US" sz="1600" dirty="0" err="1">
+                <a:solidFill>
+                  <a:srgbClr val="00B050"/>
+                </a:solidFill>
+              </a:rPr>
+              <a:t>pagina</a:t>
+            </a:r>
+            <a:r>
+              <a:rPr lang="en-US" sz="1600" dirty="0">
+                <a:solidFill>
+                  <a:srgbClr val="00B050"/>
                 </a:solidFill>
               </a:rPr>
               <a:t> </a:t>
             </a:r>
             <a:r>
-              <a:rPr lang="en-US" dirty="0"/>
-              <a:t>(form </a:t>
-            </a:r>
-            <a:r>
-              <a:rPr lang="en-US" dirty="0" err="1"/>
-              <a:t>registrazione</a:t>
-            </a:r>
-            <a:r>
-              <a:rPr lang="en-US" dirty="0"/>
+              <a:rPr lang="en-US" sz="1600" dirty="0" err="1">
+                <a:solidFill>
+                  <a:srgbClr val="00B050"/>
+                </a:solidFill>
+              </a:rPr>
+              <a:t>anagrafica</a:t>
+            </a:r>
+            <a:r>
+              <a:rPr lang="en-US" sz="1600" dirty="0">
+                <a:solidFill>
+                  <a:srgbClr val="00B050"/>
+                </a:solidFill>
+              </a:rPr>
+              <a:t> da cui </a:t>
+            </a:r>
+            <a:r>
+              <a:rPr lang="en-US" sz="1600" dirty="0" err="1">
+                <a:solidFill>
+                  <a:srgbClr val="00B050"/>
+                </a:solidFill>
+              </a:rPr>
+              <a:t>selezionare</a:t>
+            </a:r>
+            <a:r>
+              <a:rPr lang="en-US" sz="1600" dirty="0">
+                <a:solidFill>
+                  <a:srgbClr val="00B050"/>
+                </a:solidFill>
+              </a:rPr>
               <a:t>) </a:t>
             </a:r>
           </a:p>
           <a:p>
             <a:pPr lvl="1"/>
             <a:r>
-              <a:rPr lang="en-US" dirty="0"/>
-              <a:t>RecordsPage.html (</a:t>
-            </a:r>
-            <a:r>
-              <a:rPr lang="en-US" dirty="0" err="1"/>
-              <a:t>pagina</a:t>
-            </a:r>
-            <a:r>
-              <a:rPr lang="en-US" dirty="0"/>
-              <a:t> </a:t>
-            </a:r>
-            <a:r>
-              <a:rPr lang="en-US" dirty="0" err="1"/>
-              <a:t>anagrafica</a:t>
-            </a:r>
-            <a:r>
-              <a:rPr lang="en-US" dirty="0"/>
-              <a:t> da cui </a:t>
-            </a:r>
-            <a:r>
-              <a:rPr lang="en-US" dirty="0" err="1"/>
-              <a:t>selezionare</a:t>
-            </a:r>
-            <a:r>
-              <a:rPr lang="en-US" dirty="0"/>
-              <a:t>(?)) </a:t>
+              <a:rPr lang="en-US" sz="1600" dirty="0">
+                <a:solidFill>
+                  <a:srgbClr val="00B050"/>
+                </a:solidFill>
+              </a:rPr>
+              <a:t>index.html (Benvenuto etc..)</a:t>
             </a:r>
           </a:p>
           <a:p>
             <a:pPr lvl="1"/>
             <a:r>
-              <a:rPr lang="en-US" dirty="0">
+              <a:rPr lang="en-US" sz="1600" dirty="0">
                 <a:solidFill>
                   <a:srgbClr val="00B050"/>
                 </a:solidFill>
               </a:rPr>
-              <a:t>index.html </a:t>
-            </a:r>
-            <a:r>
-              <a:rPr lang="en-US" dirty="0"/>
-              <a:t>(Benvenuto etc..)</a:t>
-            </a:r>
-          </a:p>
-          <a:p>
-            <a:pPr lvl="1"/>
-            <a:r>
-              <a:rPr lang="en-US" dirty="0" err="1"/>
-              <a:t>Pagina</a:t>
-            </a:r>
-            <a:r>
-              <a:rPr lang="en-US" dirty="0"/>
-              <a:t> CANCELLAZIONE</a:t>
-            </a:r>
-          </a:p>
-          <a:p>
-            <a:r>
-              <a:rPr lang="en-US" dirty="0"/>
+              <a:t>CancellationPage.html</a:t>
+            </a:r>
+          </a:p>
+          <a:p>
+            <a:r>
+              <a:rPr lang="en-US" sz="1800" dirty="0"/>
               <a:t>The database connection is created by controllers in the </a:t>
             </a:r>
             <a:r>
-              <a:rPr lang="en-US" dirty="0" err="1">
+              <a:rPr lang="en-US" sz="1800" dirty="0" err="1">
                 <a:latin typeface="Courier New" panose="02070309020205020404" pitchFamily="49" charset="0"/>
                 <a:cs typeface="Courier New" panose="02070309020205020404" pitchFamily="49" charset="0"/>
               </a:rPr>
               <a:t>init</a:t>
             </a:r>
             <a:r>
-              <a:rPr lang="en-US" dirty="0">
+              <a:rPr lang="en-US" sz="1800" dirty="0">
                 <a:latin typeface="Courier New" panose="02070309020205020404" pitchFamily="49" charset="0"/>
                 <a:cs typeface="Courier New" panose="02070309020205020404" pitchFamily="49" charset="0"/>
               </a:rPr>
               <a:t>()</a:t>
             </a:r>
             <a:r>
-              <a:rPr lang="en-US" dirty="0"/>
+              <a:rPr lang="en-US" sz="1800" dirty="0"/>
               <a:t> method and passed to the DAO</a:t>
             </a:r>
           </a:p>
@@ -13442,8 +13560,8 @@
         </p:nvSpPr>
         <p:spPr>
           <a:xfrm>
-            <a:off x="1188087" y="1433012"/>
-            <a:ext cx="1910316" cy="466503"/>
+            <a:off x="1033485" y="1432929"/>
+            <a:ext cx="2057061" cy="466503"/>
           </a:xfrm>
           <a:prstGeom prst="rect">
             <a:avLst/>
@@ -13486,7 +13604,7 @@
                 <a:cs typeface="Calibri"/>
                 <a:sym typeface="Calibri"/>
               </a:rPr>
-              <a:t>CreateMeeting</a:t>
+              <a:t>GoToRecordsPage</a:t>
             </a:r>
             <a:endParaRPr dirty="0">
               <a:solidFill>
@@ -14772,8 +14890,8 @@
         </p:nvSpPr>
         <p:spPr>
           <a:xfrm>
-            <a:off x="1431172" y="1259000"/>
-            <a:ext cx="1910316" cy="466503"/>
+            <a:off x="1316652" y="1269690"/>
+            <a:ext cx="2139353" cy="466503"/>
           </a:xfrm>
           <a:prstGeom prst="rect">
             <a:avLst/>
@@ -14816,7 +14934,7 @@
                 <a:cs typeface="Calibri"/>
                 <a:sym typeface="Calibri"/>
               </a:rPr>
-              <a:t>CreateMeeting</a:t>
+              <a:t>GoToRecordsPage</a:t>
             </a:r>
             <a:endParaRPr dirty="0">
               <a:solidFill>
@@ -15621,8 +15739,8 @@
         </p:nvSpPr>
         <p:spPr>
           <a:xfrm>
-            <a:off x="3000718" y="3567541"/>
-            <a:ext cx="3512730" cy="400110"/>
+            <a:off x="2707185" y="3567541"/>
+            <a:ext cx="4237409" cy="400110"/>
           </a:xfrm>
           <a:prstGeom prst="rect">
             <a:avLst/>
@@ -15650,6 +15768,14 @@
             <a:r>
               <a:rPr lang="it-IT" sz="2000" dirty="0"/>
               <a:t>, </a:t>
+            </a:r>
+            <a:r>
+              <a:rPr lang="it-IT" sz="2000" dirty="0" err="1"/>
+              <a:t>sUsers</a:t>
+            </a:r>
+            <a:r>
+              <a:rPr lang="it-IT" sz="2000" dirty="0"/>
+              <a:t> </a:t>
             </a:r>
             <a:r>
               <a:rPr lang="it-IT" sz="2000" dirty="0" err="1"/>
@@ -15873,7 +15999,7 @@
         </p:nvSpPr>
         <p:spPr>
           <a:xfrm>
-            <a:off x="3933824" y="4699320"/>
+            <a:off x="3606851" y="4699320"/>
             <a:ext cx="3988565" cy="400110"/>
           </a:xfrm>
           <a:prstGeom prst="rect">
@@ -15893,7 +16019,7 @@
             </a:r>
             <a:r>
               <a:rPr lang="it-IT" sz="2000" dirty="0"/>
-              <a:t>(‘RecordsPage.html’’, </a:t>
+              <a:t>(‘’RecordsPage.html’’, </a:t>
             </a:r>
             <a:r>
               <a:rPr lang="it-IT" sz="2000" dirty="0" err="1"/>
@@ -16069,7 +16195,7 @@
                 <a:cs typeface="Calibri"/>
                 <a:sym typeface="Calibri"/>
               </a:rPr>
-              <a:t>CreateMeeting</a:t>
+              <a:t>InvitePeople</a:t>
             </a:r>
             <a:endParaRPr dirty="0">
               <a:solidFill>
@@ -16930,8 +17056,8 @@
         </p:nvSpPr>
         <p:spPr>
           <a:xfrm>
-            <a:off x="4114559" y="4359910"/>
-            <a:ext cx="1897075" cy="400110"/>
+            <a:off x="4035421" y="4359014"/>
+            <a:ext cx="2060579" cy="400110"/>
           </a:xfrm>
           <a:prstGeom prst="rect">
             <a:avLst/>
@@ -16946,7 +17072,7 @@
           <a:p>
             <a:r>
               <a:rPr lang="it-IT" sz="2000" dirty="0" err="1"/>
-              <a:t>invitePeople</a:t>
+              <a:t>sendInvitation</a:t>
             </a:r>
             <a:r>
               <a:rPr lang="it-IT" sz="2000" dirty="0"/>
@@ -17286,7 +17412,7 @@
                 <a:cs typeface="Calibri"/>
                 <a:sym typeface="Calibri"/>
               </a:rPr>
-              <a:t>CreateMeeting</a:t>
+              <a:t>InvitePeople</a:t>
             </a:r>
             <a:endParaRPr dirty="0">
               <a:solidFill>
@@ -18139,7 +18265,7 @@
         </p:nvSpPr>
         <p:spPr>
           <a:xfrm>
-            <a:off x="2769610" y="3463725"/>
+            <a:off x="2769610" y="3421119"/>
             <a:ext cx="4174985" cy="400110"/>
           </a:xfrm>
           <a:prstGeom prst="rect">
@@ -18162,15 +18288,31 @@
               <a:t>(</a:t>
             </a:r>
             <a:r>
-              <a:rPr lang="it-IT" sz="2000" dirty="0" err="1"/>
-              <a:t>selectedPeople</a:t>
-            </a:r>
-            <a:r>
-              <a:rPr lang="it-IT" sz="2000" dirty="0"/>
+              <a:rPr lang="it-IT" sz="1400" dirty="0" err="1"/>
+              <a:t>rUsers</a:t>
+            </a:r>
+            <a:r>
+              <a:rPr lang="it-IT" sz="1400" dirty="0"/>
               <a:t>, </a:t>
             </a:r>
             <a:r>
-              <a:rPr lang="it-IT" sz="2000" dirty="0" err="1"/>
+              <a:rPr lang="it-IT" sz="1400" dirty="0" err="1"/>
+              <a:t>sUsers</a:t>
+            </a:r>
+            <a:r>
+              <a:rPr lang="it-IT" sz="1400" dirty="0"/>
+              <a:t>, </a:t>
+            </a:r>
+            <a:r>
+              <a:rPr lang="it-IT" sz="1400" dirty="0" err="1"/>
+              <a:t>toDeselect</a:t>
+            </a:r>
+            <a:r>
+              <a:rPr lang="it-IT" sz="1400" dirty="0"/>
+              <a:t>, </a:t>
+            </a:r>
+            <a:r>
+              <a:rPr lang="it-IT" sz="1400" dirty="0" err="1"/>
               <a:t>attempt</a:t>
             </a:r>
             <a:r>
@@ -18390,7 +18532,7 @@
                 <a:cs typeface="Calibri"/>
                 <a:sym typeface="Calibri"/>
               </a:rPr>
-              <a:t>CreateMeeting</a:t>
+              <a:t>InvitePeople</a:t>
             </a:r>
             <a:endParaRPr dirty="0">
               <a:solidFill>
@@ -20569,65 +20711,9 @@
         </p:spPr>
         <p:txBody>
           <a:bodyPr>
-            <a:normAutofit fontScale="70000" lnSpcReduction="20000"/>
+            <a:normAutofit fontScale="85000" lnSpcReduction="20000"/>
           </a:bodyPr>
           <a:lstStyle/>
-          <a:p>
-            <a:r>
-              <a:rPr lang="it-IT" dirty="0">
-                <a:solidFill>
-                  <a:srgbClr val="00B0F0"/>
-                </a:solidFill>
-              </a:rPr>
-              <a:t>Vedere </a:t>
-            </a:r>
-            <a:r>
-              <a:rPr lang="it-IT" dirty="0" err="1">
-                <a:solidFill>
-                  <a:srgbClr val="00B0F0"/>
-                </a:solidFill>
-              </a:rPr>
-              <a:t>application</a:t>
-            </a:r>
-            <a:r>
-              <a:rPr lang="it-IT" dirty="0">
-                <a:solidFill>
-                  <a:srgbClr val="00B0F0"/>
-                </a:solidFill>
-              </a:rPr>
-              <a:t> design dei progetti fatti da loro</a:t>
-            </a:r>
-          </a:p>
-          <a:p>
-            <a:r>
-              <a:rPr lang="it-IT" dirty="0">
-                <a:solidFill>
-                  <a:srgbClr val="00B0F0"/>
-                </a:solidFill>
-              </a:rPr>
-              <a:t>Vedere events flow</a:t>
-            </a:r>
-          </a:p>
-          <a:p>
-            <a:r>
-              <a:rPr lang="it-IT" dirty="0"/>
-              <a:t>TUTTE LE RIUNIONI VISUALIZZATE NON DEVONO ESSERE ANCORA SCADUTE!!! SIA QUELLE CREATE CHE QUELLE A CUI SI È INVITATI!!! Ma probabilmente basta giocare con alcuni </a:t>
-            </a:r>
-            <a:r>
-              <a:rPr lang="it-IT" dirty="0" err="1"/>
-              <a:t>if</a:t>
-            </a:r>
-            <a:r>
-              <a:rPr lang="it-IT" dirty="0"/>
-              <a:t> nel DAO</a:t>
-            </a:r>
-          </a:p>
-          <a:p>
-            <a:r>
-              <a:rPr lang="it-IT" dirty="0"/>
-              <a:t>Vedere progetti di studenti degli anni passati</a:t>
-            </a:r>
-          </a:p>
           <a:p>
             <a:r>
               <a:rPr lang="it-IT" dirty="0"/>
@@ -20689,27 +20775,7 @@
             </a:r>
             <a:r>
               <a:rPr lang="it-IT" dirty="0"/>
-              <a:t> e FUNZIONA ma poi smette di funzionare la parte di sotto !!!! (controllare tutto ciò)</a:t>
-            </a:r>
-          </a:p>
-          <a:p>
-            <a:r>
-              <a:rPr lang="it-IT" dirty="0"/>
-              <a:t>Creare pagina anagrafica</a:t>
-            </a:r>
-          </a:p>
-          <a:p>
-            <a:r>
-              <a:rPr lang="it-IT" dirty="0"/>
-              <a:t>Da </a:t>
-            </a:r>
-            <a:r>
-              <a:rPr lang="it-IT" dirty="0" err="1"/>
-              <a:t>createMeeting</a:t>
-            </a:r>
-            <a:r>
-              <a:rPr lang="it-IT" dirty="0"/>
-              <a:t> devo già reperire gli user da mostrare in RecordsPage.html</a:t>
+              <a:t> e FUNZIONA ma poi smette di funzionare la parte di sotto !!!! (controllare tutto ciò) </a:t>
             </a:r>
           </a:p>
           <a:p>
@@ -20735,22 +20801,117 @@
           <a:p>
             <a:r>
               <a:rPr lang="it-IT" dirty="0"/>
-              <a:t>Logout (e pagina cancellazione???) nell’IFML</a:t>
-            </a:r>
-          </a:p>
-          <a:p>
+              <a:t>Bisogna fare in modo che se user != </a:t>
+            </a:r>
+            <a:r>
+              <a:rPr lang="it-IT" dirty="0" err="1"/>
+              <a:t>null</a:t>
+            </a:r>
             <a:r>
               <a:rPr lang="it-IT" dirty="0"/>
-              <a:t>Correggere </a:t>
+              <a:t> nella sessione non mi fa andare in </a:t>
             </a:r>
             <a:r>
               <a:rPr lang="it-IT" dirty="0" err="1"/>
-              <a:t>ifml</a:t>
-            </a:r>
-            <a:endParaRPr lang="it-IT"/>
-          </a:p>
-          <a:p>
+              <a:t>signup</a:t>
+            </a:r>
+            <a:r>
+              <a:rPr lang="it-IT" dirty="0"/>
+              <a:t> ?? </a:t>
+            </a:r>
+          </a:p>
+          <a:p>
+            <a:r>
+              <a:rPr lang="it-IT" dirty="0"/>
+              <a:t>Sistemare meglio tutto per evitare duplicazione di codice</a:t>
+            </a:r>
+          </a:p>
+          <a:p>
+            <a:r>
+              <a:rPr lang="it-IT" dirty="0"/>
+              <a:t>Cambiare le </a:t>
+            </a:r>
+            <a:r>
+              <a:rPr lang="it-IT" dirty="0" err="1"/>
+              <a:t>print</a:t>
+            </a:r>
+            <a:r>
+              <a:rPr lang="it-IT" dirty="0"/>
+              <a:t> </a:t>
+            </a:r>
+            <a:r>
+              <a:rPr lang="it-IT" dirty="0" err="1"/>
+              <a:t>stacktrace</a:t>
+            </a:r>
             <a:endParaRPr lang="it-IT" dirty="0"/>
+          </a:p>
+          <a:p>
+            <a:r>
+              <a:rPr lang="it-IT" dirty="0"/>
+              <a:t>Cambiare le </a:t>
+            </a:r>
+            <a:r>
+              <a:rPr lang="it-IT" dirty="0" err="1"/>
+              <a:t>redirect</a:t>
+            </a:r>
+            <a:r>
+              <a:rPr lang="it-IT" dirty="0"/>
+              <a:t> </a:t>
+            </a:r>
+            <a:r>
+              <a:rPr lang="it-IT" dirty="0" err="1"/>
+              <a:t>Wrong</a:t>
+            </a:r>
+            <a:r>
+              <a:rPr lang="it-IT" dirty="0"/>
+              <a:t>, </a:t>
+            </a:r>
+            <a:r>
+              <a:rPr lang="it-IT" dirty="0" err="1"/>
+              <a:t>Error</a:t>
+            </a:r>
+            <a:r>
+              <a:rPr lang="it-IT" dirty="0"/>
+              <a:t>, </a:t>
+            </a:r>
+            <a:r>
+              <a:rPr lang="it-IT" dirty="0" err="1"/>
+              <a:t>etc</a:t>
+            </a:r>
+            <a:endParaRPr lang="it-IT" dirty="0"/>
+          </a:p>
+          <a:p>
+            <a:r>
+              <a:rPr lang="it-IT" dirty="0"/>
+              <a:t>Possiamo provare a passare a </a:t>
+            </a:r>
+            <a:r>
+              <a:rPr lang="it-IT" dirty="0" err="1"/>
+              <a:t>records</a:t>
+            </a:r>
+            <a:r>
+              <a:rPr lang="it-IT" dirty="0"/>
+              <a:t> page l’array di username anziché </a:t>
+            </a:r>
+            <a:r>
+              <a:rPr lang="it-IT" dirty="0" err="1"/>
+              <a:t>sUsers</a:t>
+            </a:r>
+            <a:r>
+              <a:rPr lang="it-IT" dirty="0"/>
+              <a:t> perché mi sa che non prende la condizione in </a:t>
+            </a:r>
+            <a:r>
+              <a:rPr lang="it-IT" dirty="0" err="1"/>
+              <a:t>th:checked</a:t>
+            </a:r>
+            <a:endParaRPr lang="it-IT" dirty="0"/>
+          </a:p>
+          <a:p>
+            <a:r>
+              <a:rPr lang="it-IT" dirty="0"/>
+              <a:t>Provare a risistemare la questione di SignUp.html</a:t>
+            </a:r>
           </a:p>
         </p:txBody>
       </p:sp>

</xml_diff>